<commit_message>
Added presentation raw version, began with abstract
</commit_message>
<xml_diff>
--- a/Documentation/ProjectDocumentation/Presentation.pptx
+++ b/Documentation/ProjectDocumentation/Presentation.pptx
@@ -4,6 +4,20 @@
   <p:sldMasterIdLst>
     <p:sldMasterId id="2147483648" r:id="rId1"/>
   </p:sldMasterIdLst>
+  <p:sldIdLst>
+    <p:sldId id="256" r:id="rId2"/>
+    <p:sldId id="258" r:id="rId3"/>
+    <p:sldId id="257" r:id="rId4"/>
+    <p:sldId id="259" r:id="rId5"/>
+    <p:sldId id="266" r:id="rId6"/>
+    <p:sldId id="267" r:id="rId7"/>
+    <p:sldId id="260" r:id="rId8"/>
+    <p:sldId id="264" r:id="rId9"/>
+    <p:sldId id="261" r:id="rId10"/>
+    <p:sldId id="265" r:id="rId11"/>
+    <p:sldId id="262" r:id="rId12"/>
+    <p:sldId id="263" r:id="rId13"/>
+  </p:sldIdLst>
   <p:sldSz cx="9144000" cy="6858000" type="screen4x3"/>
   <p:notesSz cx="6858000" cy="9144000"/>
   <p:defaultTextStyle>
@@ -101,6 +115,22 @@
       </a:defRPr>
     </a:lvl9pPr>
   </p:defaultTextStyle>
+  <p:extLst>
+    <p:ext uri="{EFAFB233-063F-42B5-8137-9DF3F51BA10A}">
+      <p15:sldGuideLst xmlns:p15="http://schemas.microsoft.com/office/powerpoint/2012/main">
+        <p15:guide id="1" orient="horz" pos="2160">
+          <p15:clr>
+            <a:srgbClr val="A4A3A4"/>
+          </p15:clr>
+        </p15:guide>
+        <p15:guide id="2" pos="2880">
+          <p15:clr>
+            <a:srgbClr val="A4A3A4"/>
+          </p15:clr>
+        </p15:guide>
+      </p15:sldGuideLst>
+    </p:ext>
+  </p:extLst>
 </p:presentation>
 </file>
 
@@ -142,10 +172,9 @@
           <a:lstStyle/>
           <a:p>
             <a:r>
-              <a:rPr lang="de-DE" smtClean="0"/>
+              <a:rPr lang="de-DE"/>
               <a:t>Titelmasterformat durch Klicken bearbeiten</a:t>
             </a:r>
-            <a:endParaRPr lang="de-DE"/>
           </a:p>
         </p:txBody>
       </p:sp>
@@ -261,10 +290,9 @@
           </a:lstStyle>
           <a:p>
             <a:r>
-              <a:rPr lang="de-DE" smtClean="0"/>
+              <a:rPr lang="de-DE"/>
               <a:t>Formatvorlage des Untertitelmasters durch Klicken bearbeiten</a:t>
             </a:r>
-            <a:endParaRPr lang="de-DE"/>
           </a:p>
         </p:txBody>
       </p:sp>
@@ -285,7 +313,7 @@
           <a:p>
             <a:fld id="{1BA50D42-C9CD-4801-B293-61D1F53EC57E}" type="datetimeFigureOut">
               <a:rPr lang="de-DE" smtClean="0"/>
-              <a:t>14.09.2006</a:t>
+              <a:t>03.02.2022</a:t>
             </a:fld>
             <a:endParaRPr lang="de-DE"/>
           </a:p>
@@ -374,10 +402,9 @@
           <a:lstStyle/>
           <a:p>
             <a:r>
-              <a:rPr lang="de-DE" smtClean="0"/>
+              <a:rPr lang="de-DE"/>
               <a:t>Titelmasterformat durch Klicken bearbeiten</a:t>
             </a:r>
-            <a:endParaRPr lang="de-DE"/>
           </a:p>
         </p:txBody>
       </p:sp>
@@ -398,38 +425,37 @@
           <a:p>
             <a:pPr lvl="0"/>
             <a:r>
-              <a:rPr lang="de-DE" smtClean="0"/>
+              <a:rPr lang="de-DE"/>
               <a:t>Textmasterformate durch Klicken bearbeiten</a:t>
             </a:r>
           </a:p>
           <a:p>
             <a:pPr lvl="1"/>
             <a:r>
-              <a:rPr lang="de-DE" smtClean="0"/>
+              <a:rPr lang="de-DE"/>
               <a:t>Zweite Ebene</a:t>
             </a:r>
           </a:p>
           <a:p>
             <a:pPr lvl="2"/>
             <a:r>
-              <a:rPr lang="de-DE" smtClean="0"/>
+              <a:rPr lang="de-DE"/>
               <a:t>Dritte Ebene</a:t>
             </a:r>
           </a:p>
           <a:p>
             <a:pPr lvl="3"/>
             <a:r>
-              <a:rPr lang="de-DE" smtClean="0"/>
+              <a:rPr lang="de-DE"/>
               <a:t>Vierte Ebene</a:t>
             </a:r>
           </a:p>
           <a:p>
             <a:pPr lvl="4"/>
             <a:r>
-              <a:rPr lang="de-DE" smtClean="0"/>
+              <a:rPr lang="de-DE"/>
               <a:t>Fünfte Ebene</a:t>
             </a:r>
-            <a:endParaRPr lang="de-DE"/>
           </a:p>
         </p:txBody>
       </p:sp>
@@ -450,7 +476,7 @@
           <a:p>
             <a:fld id="{1BA50D42-C9CD-4801-B293-61D1F53EC57E}" type="datetimeFigureOut">
               <a:rPr lang="de-DE" smtClean="0"/>
-              <a:t>14.09.2006</a:t>
+              <a:t>03.02.2022</a:t>
             </a:fld>
             <a:endParaRPr lang="de-DE"/>
           </a:p>
@@ -544,10 +570,9 @@
           <a:lstStyle/>
           <a:p>
             <a:r>
-              <a:rPr lang="de-DE" smtClean="0"/>
+              <a:rPr lang="de-DE"/>
               <a:t>Titel durch Klicken hinzufügen</a:t>
             </a:r>
-            <a:endParaRPr lang="de-DE"/>
           </a:p>
         </p:txBody>
       </p:sp>
@@ -573,38 +598,37 @@
           <a:p>
             <a:pPr lvl="0"/>
             <a:r>
-              <a:rPr lang="de-DE" smtClean="0"/>
+              <a:rPr lang="de-DE"/>
               <a:t>Textmasterformate durch Klicken bearbeiten</a:t>
             </a:r>
           </a:p>
           <a:p>
             <a:pPr lvl="1"/>
             <a:r>
-              <a:rPr lang="de-DE" smtClean="0"/>
+              <a:rPr lang="de-DE"/>
               <a:t>Zweite Ebene</a:t>
             </a:r>
           </a:p>
           <a:p>
             <a:pPr lvl="2"/>
             <a:r>
-              <a:rPr lang="de-DE" smtClean="0"/>
+              <a:rPr lang="de-DE"/>
               <a:t>Dritte Ebene</a:t>
             </a:r>
           </a:p>
           <a:p>
             <a:pPr lvl="3"/>
             <a:r>
-              <a:rPr lang="de-DE" smtClean="0"/>
+              <a:rPr lang="de-DE"/>
               <a:t>Vierte Ebene</a:t>
             </a:r>
           </a:p>
           <a:p>
             <a:pPr lvl="4"/>
             <a:r>
-              <a:rPr lang="de-DE" smtClean="0"/>
+              <a:rPr lang="de-DE"/>
               <a:t>Fünfte Ebene</a:t>
             </a:r>
-            <a:endParaRPr lang="de-DE"/>
           </a:p>
         </p:txBody>
       </p:sp>
@@ -625,7 +649,7 @@
           <a:p>
             <a:fld id="{1BA50D42-C9CD-4801-B293-61D1F53EC57E}" type="datetimeFigureOut">
               <a:rPr lang="de-DE" smtClean="0"/>
-              <a:t>14.09.2006</a:t>
+              <a:t>03.02.2022</a:t>
             </a:fld>
             <a:endParaRPr lang="de-DE"/>
           </a:p>
@@ -714,10 +738,9 @@
           <a:lstStyle/>
           <a:p>
             <a:r>
-              <a:rPr lang="de-DE" smtClean="0"/>
+              <a:rPr lang="de-DE"/>
               <a:t>Titelmasterformat durch Klicken bearbeiten</a:t>
             </a:r>
-            <a:endParaRPr lang="de-DE"/>
           </a:p>
         </p:txBody>
       </p:sp>
@@ -738,38 +761,37 @@
           <a:p>
             <a:pPr lvl="0"/>
             <a:r>
-              <a:rPr lang="de-DE" smtClean="0"/>
+              <a:rPr lang="de-DE"/>
               <a:t>Textmasterformate durch Klicken bearbeiten</a:t>
             </a:r>
           </a:p>
           <a:p>
             <a:pPr lvl="1"/>
             <a:r>
-              <a:rPr lang="de-DE" smtClean="0"/>
+              <a:rPr lang="de-DE"/>
               <a:t>Zweite Ebene</a:t>
             </a:r>
           </a:p>
           <a:p>
             <a:pPr lvl="2"/>
             <a:r>
-              <a:rPr lang="de-DE" smtClean="0"/>
+              <a:rPr lang="de-DE"/>
               <a:t>Dritte Ebene</a:t>
             </a:r>
           </a:p>
           <a:p>
             <a:pPr lvl="3"/>
             <a:r>
-              <a:rPr lang="de-DE" smtClean="0"/>
+              <a:rPr lang="de-DE"/>
               <a:t>Vierte Ebene</a:t>
             </a:r>
           </a:p>
           <a:p>
             <a:pPr lvl="4"/>
             <a:r>
-              <a:rPr lang="de-DE" smtClean="0"/>
+              <a:rPr lang="de-DE"/>
               <a:t>Fünfte Ebene</a:t>
             </a:r>
-            <a:endParaRPr lang="de-DE"/>
           </a:p>
         </p:txBody>
       </p:sp>
@@ -790,7 +812,7 @@
           <a:p>
             <a:fld id="{1BA50D42-C9CD-4801-B293-61D1F53EC57E}" type="datetimeFigureOut">
               <a:rPr lang="de-DE" smtClean="0"/>
-              <a:t>14.09.2006</a:t>
+              <a:t>03.02.2022</a:t>
             </a:fld>
             <a:endParaRPr lang="de-DE"/>
           </a:p>
@@ -888,10 +910,9 @@
           </a:lstStyle>
           <a:p>
             <a:r>
-              <a:rPr lang="de-DE" smtClean="0"/>
+              <a:rPr lang="de-DE"/>
               <a:t>Titelmasterformat durch Klicken bearbeiten</a:t>
             </a:r>
-            <a:endParaRPr lang="de-DE"/>
           </a:p>
         </p:txBody>
       </p:sp>
@@ -1008,7 +1029,7 @@
           <a:p>
             <a:pPr lvl="0"/>
             <a:r>
-              <a:rPr lang="de-DE" smtClean="0"/>
+              <a:rPr lang="de-DE"/>
               <a:t>Textmasterformate durch Klicken bearbeiten</a:t>
             </a:r>
           </a:p>
@@ -1031,7 +1052,7 @@
           <a:p>
             <a:fld id="{1BA50D42-C9CD-4801-B293-61D1F53EC57E}" type="datetimeFigureOut">
               <a:rPr lang="de-DE" smtClean="0"/>
-              <a:t>14.09.2006</a:t>
+              <a:t>03.02.2022</a:t>
             </a:fld>
             <a:endParaRPr lang="de-DE"/>
           </a:p>
@@ -1120,10 +1141,9 @@
           <a:lstStyle/>
           <a:p>
             <a:r>
-              <a:rPr lang="de-DE" smtClean="0"/>
+              <a:rPr lang="de-DE"/>
               <a:t>Titelmasterformat durch Klicken bearbeiten</a:t>
             </a:r>
-            <a:endParaRPr lang="de-DE"/>
           </a:p>
         </p:txBody>
       </p:sp>
@@ -1177,38 +1197,37 @@
           <a:p>
             <a:pPr lvl="0"/>
             <a:r>
-              <a:rPr lang="de-DE" smtClean="0"/>
+              <a:rPr lang="de-DE"/>
               <a:t>Textmasterformate durch Klicken bearbeiten</a:t>
             </a:r>
           </a:p>
           <a:p>
             <a:pPr lvl="1"/>
             <a:r>
-              <a:rPr lang="de-DE" smtClean="0"/>
+              <a:rPr lang="de-DE"/>
               <a:t>Zweite Ebene</a:t>
             </a:r>
           </a:p>
           <a:p>
             <a:pPr lvl="2"/>
             <a:r>
-              <a:rPr lang="de-DE" smtClean="0"/>
+              <a:rPr lang="de-DE"/>
               <a:t>Dritte Ebene</a:t>
             </a:r>
           </a:p>
           <a:p>
             <a:pPr lvl="3"/>
             <a:r>
-              <a:rPr lang="de-DE" smtClean="0"/>
+              <a:rPr lang="de-DE"/>
               <a:t>Vierte Ebene</a:t>
             </a:r>
           </a:p>
           <a:p>
             <a:pPr lvl="4"/>
             <a:r>
-              <a:rPr lang="de-DE" smtClean="0"/>
+              <a:rPr lang="de-DE"/>
               <a:t>Fünfte Ebene</a:t>
             </a:r>
-            <a:endParaRPr lang="de-DE"/>
           </a:p>
         </p:txBody>
       </p:sp>
@@ -1262,38 +1281,37 @@
           <a:p>
             <a:pPr lvl="0"/>
             <a:r>
-              <a:rPr lang="de-DE" smtClean="0"/>
+              <a:rPr lang="de-DE"/>
               <a:t>Textmasterformate durch Klicken bearbeiten</a:t>
             </a:r>
           </a:p>
           <a:p>
             <a:pPr lvl="1"/>
             <a:r>
-              <a:rPr lang="de-DE" smtClean="0"/>
+              <a:rPr lang="de-DE"/>
               <a:t>Zweite Ebene</a:t>
             </a:r>
           </a:p>
           <a:p>
             <a:pPr lvl="2"/>
             <a:r>
-              <a:rPr lang="de-DE" smtClean="0"/>
+              <a:rPr lang="de-DE"/>
               <a:t>Dritte Ebene</a:t>
             </a:r>
           </a:p>
           <a:p>
             <a:pPr lvl="3"/>
             <a:r>
-              <a:rPr lang="de-DE" smtClean="0"/>
+              <a:rPr lang="de-DE"/>
               <a:t>Vierte Ebene</a:t>
             </a:r>
           </a:p>
           <a:p>
             <a:pPr lvl="4"/>
             <a:r>
-              <a:rPr lang="de-DE" smtClean="0"/>
+              <a:rPr lang="de-DE"/>
               <a:t>Fünfte Ebene</a:t>
             </a:r>
-            <a:endParaRPr lang="de-DE"/>
           </a:p>
         </p:txBody>
       </p:sp>
@@ -1314,7 +1332,7 @@
           <a:p>
             <a:fld id="{1BA50D42-C9CD-4801-B293-61D1F53EC57E}" type="datetimeFigureOut">
               <a:rPr lang="de-DE" smtClean="0"/>
-              <a:t>14.09.2006</a:t>
+              <a:t>03.02.2022</a:t>
             </a:fld>
             <a:endParaRPr lang="de-DE"/>
           </a:p>
@@ -1407,10 +1425,9 @@
           </a:lstStyle>
           <a:p>
             <a:r>
-              <a:rPr lang="de-DE" smtClean="0"/>
+              <a:rPr lang="de-DE"/>
               <a:t>Titelmasterformat durch Klicken bearbeiten</a:t>
             </a:r>
-            <a:endParaRPr lang="de-DE"/>
           </a:p>
         </p:txBody>
       </p:sp>
@@ -1473,7 +1490,7 @@
           <a:p>
             <a:pPr lvl="0"/>
             <a:r>
-              <a:rPr lang="de-DE" smtClean="0"/>
+              <a:rPr lang="de-DE"/>
               <a:t>Textmasterformate durch Klicken bearbeiten</a:t>
             </a:r>
           </a:p>
@@ -1529,38 +1546,37 @@
           <a:p>
             <a:pPr lvl="0"/>
             <a:r>
-              <a:rPr lang="de-DE" smtClean="0"/>
+              <a:rPr lang="de-DE"/>
               <a:t>Textmasterformate durch Klicken bearbeiten</a:t>
             </a:r>
           </a:p>
           <a:p>
             <a:pPr lvl="1"/>
             <a:r>
-              <a:rPr lang="de-DE" smtClean="0"/>
+              <a:rPr lang="de-DE"/>
               <a:t>Zweite Ebene</a:t>
             </a:r>
           </a:p>
           <a:p>
             <a:pPr lvl="2"/>
             <a:r>
-              <a:rPr lang="de-DE" smtClean="0"/>
+              <a:rPr lang="de-DE"/>
               <a:t>Dritte Ebene</a:t>
             </a:r>
           </a:p>
           <a:p>
             <a:pPr lvl="3"/>
             <a:r>
-              <a:rPr lang="de-DE" smtClean="0"/>
+              <a:rPr lang="de-DE"/>
               <a:t>Vierte Ebene</a:t>
             </a:r>
           </a:p>
           <a:p>
             <a:pPr lvl="4"/>
             <a:r>
-              <a:rPr lang="de-DE" smtClean="0"/>
+              <a:rPr lang="de-DE"/>
               <a:t>Fünfte Ebene</a:t>
             </a:r>
-            <a:endParaRPr lang="de-DE"/>
           </a:p>
         </p:txBody>
       </p:sp>
@@ -1623,7 +1639,7 @@
           <a:p>
             <a:pPr lvl="0"/>
             <a:r>
-              <a:rPr lang="de-DE" smtClean="0"/>
+              <a:rPr lang="de-DE"/>
               <a:t>Textmasterformate durch Klicken bearbeiten</a:t>
             </a:r>
           </a:p>
@@ -1679,38 +1695,37 @@
           <a:p>
             <a:pPr lvl="0"/>
             <a:r>
-              <a:rPr lang="de-DE" smtClean="0"/>
+              <a:rPr lang="de-DE"/>
               <a:t>Textmasterformate durch Klicken bearbeiten</a:t>
             </a:r>
           </a:p>
           <a:p>
             <a:pPr lvl="1"/>
             <a:r>
-              <a:rPr lang="de-DE" smtClean="0"/>
+              <a:rPr lang="de-DE"/>
               <a:t>Zweite Ebene</a:t>
             </a:r>
           </a:p>
           <a:p>
             <a:pPr lvl="2"/>
             <a:r>
-              <a:rPr lang="de-DE" smtClean="0"/>
+              <a:rPr lang="de-DE"/>
               <a:t>Dritte Ebene</a:t>
             </a:r>
           </a:p>
           <a:p>
             <a:pPr lvl="3"/>
             <a:r>
-              <a:rPr lang="de-DE" smtClean="0"/>
+              <a:rPr lang="de-DE"/>
               <a:t>Vierte Ebene</a:t>
             </a:r>
           </a:p>
           <a:p>
             <a:pPr lvl="4"/>
             <a:r>
-              <a:rPr lang="de-DE" smtClean="0"/>
+              <a:rPr lang="de-DE"/>
               <a:t>Fünfte Ebene</a:t>
             </a:r>
-            <a:endParaRPr lang="de-DE"/>
           </a:p>
         </p:txBody>
       </p:sp>
@@ -1731,7 +1746,7 @@
           <a:p>
             <a:fld id="{1BA50D42-C9CD-4801-B293-61D1F53EC57E}" type="datetimeFigureOut">
               <a:rPr lang="de-DE" smtClean="0"/>
-              <a:t>14.09.2006</a:t>
+              <a:t>03.02.2022</a:t>
             </a:fld>
             <a:endParaRPr lang="de-DE"/>
           </a:p>
@@ -1820,10 +1835,9 @@
           <a:lstStyle/>
           <a:p>
             <a:r>
-              <a:rPr lang="de-DE" smtClean="0"/>
+              <a:rPr lang="de-DE"/>
               <a:t>Titelmasterformat durch Klicken bearbeiten</a:t>
             </a:r>
-            <a:endParaRPr lang="de-DE"/>
           </a:p>
         </p:txBody>
       </p:sp>
@@ -1844,7 +1858,7 @@
           <a:p>
             <a:fld id="{1BA50D42-C9CD-4801-B293-61D1F53EC57E}" type="datetimeFigureOut">
               <a:rPr lang="de-DE" smtClean="0"/>
-              <a:t>14.09.2006</a:t>
+              <a:t>03.02.2022</a:t>
             </a:fld>
             <a:endParaRPr lang="de-DE"/>
           </a:p>
@@ -1934,7 +1948,7 @@
           <a:p>
             <a:fld id="{1BA50D42-C9CD-4801-B293-61D1F53EC57E}" type="datetimeFigureOut">
               <a:rPr lang="de-DE" smtClean="0"/>
-              <a:t>14.09.2006</a:t>
+              <a:t>03.02.2022</a:t>
             </a:fld>
             <a:endParaRPr lang="de-DE"/>
           </a:p>
@@ -2032,10 +2046,9 @@
           </a:lstStyle>
           <a:p>
             <a:r>
-              <a:rPr lang="de-DE" smtClean="0"/>
+              <a:rPr lang="de-DE"/>
               <a:t>Titelmasterformat durch Klicken bearbeiten</a:t>
             </a:r>
-            <a:endParaRPr lang="de-DE"/>
           </a:p>
         </p:txBody>
       </p:sp>
@@ -2089,38 +2102,37 @@
           <a:p>
             <a:pPr lvl="0"/>
             <a:r>
-              <a:rPr lang="de-DE" smtClean="0"/>
+              <a:rPr lang="de-DE"/>
               <a:t>Textmasterformate durch Klicken bearbeiten</a:t>
             </a:r>
           </a:p>
           <a:p>
             <a:pPr lvl="1"/>
             <a:r>
-              <a:rPr lang="de-DE" smtClean="0"/>
+              <a:rPr lang="de-DE"/>
               <a:t>Zweite Ebene</a:t>
             </a:r>
           </a:p>
           <a:p>
             <a:pPr lvl="2"/>
             <a:r>
-              <a:rPr lang="de-DE" smtClean="0"/>
+              <a:rPr lang="de-DE"/>
               <a:t>Dritte Ebene</a:t>
             </a:r>
           </a:p>
           <a:p>
             <a:pPr lvl="3"/>
             <a:r>
-              <a:rPr lang="de-DE" smtClean="0"/>
+              <a:rPr lang="de-DE"/>
               <a:t>Vierte Ebene</a:t>
             </a:r>
           </a:p>
           <a:p>
             <a:pPr lvl="4"/>
             <a:r>
-              <a:rPr lang="de-DE" smtClean="0"/>
+              <a:rPr lang="de-DE"/>
               <a:t>Fünfte Ebene</a:t>
             </a:r>
-            <a:endParaRPr lang="de-DE"/>
           </a:p>
         </p:txBody>
       </p:sp>
@@ -2183,7 +2195,7 @@
           <a:p>
             <a:pPr lvl="0"/>
             <a:r>
-              <a:rPr lang="de-DE" smtClean="0"/>
+              <a:rPr lang="de-DE"/>
               <a:t>Textmasterformate durch Klicken bearbeiten</a:t>
             </a:r>
           </a:p>
@@ -2206,7 +2218,7 @@
           <a:p>
             <a:fld id="{1BA50D42-C9CD-4801-B293-61D1F53EC57E}" type="datetimeFigureOut">
               <a:rPr lang="de-DE" smtClean="0"/>
-              <a:t>14.09.2006</a:t>
+              <a:t>03.02.2022</a:t>
             </a:fld>
             <a:endParaRPr lang="de-DE"/>
           </a:p>
@@ -2304,10 +2316,9 @@
           </a:lstStyle>
           <a:p>
             <a:r>
-              <a:rPr lang="de-DE" smtClean="0"/>
+              <a:rPr lang="de-DE"/>
               <a:t>Titelmasterformat durch Klicken bearbeiten</a:t>
             </a:r>
-            <a:endParaRPr lang="de-DE"/>
           </a:p>
         </p:txBody>
       </p:sp>
@@ -2431,7 +2442,7 @@
           <a:p>
             <a:pPr lvl="0"/>
             <a:r>
-              <a:rPr lang="de-DE" smtClean="0"/>
+              <a:rPr lang="de-DE"/>
               <a:t>Textmasterformate durch Klicken bearbeiten</a:t>
             </a:r>
           </a:p>
@@ -2454,7 +2465,7 @@
           <a:p>
             <a:fld id="{1BA50D42-C9CD-4801-B293-61D1F53EC57E}" type="datetimeFigureOut">
               <a:rPr lang="de-DE" smtClean="0"/>
-              <a:t>14.09.2006</a:t>
+              <a:t>03.02.2022</a:t>
             </a:fld>
             <a:endParaRPr lang="de-DE"/>
           </a:p>
@@ -2558,10 +2569,9 @@
           <a:lstStyle/>
           <a:p>
             <a:r>
-              <a:rPr lang="de-DE" smtClean="0"/>
+              <a:rPr lang="de-DE"/>
               <a:t>Titelmasterformat durch Klicken bearbeiten</a:t>
             </a:r>
-            <a:endParaRPr lang="de-DE"/>
           </a:p>
         </p:txBody>
       </p:sp>
@@ -2592,38 +2602,37 @@
           <a:p>
             <a:pPr lvl="0"/>
             <a:r>
-              <a:rPr lang="de-DE" smtClean="0"/>
+              <a:rPr lang="de-DE"/>
               <a:t>Textmasterformate durch Klicken bearbeiten</a:t>
             </a:r>
           </a:p>
           <a:p>
             <a:pPr lvl="1"/>
             <a:r>
-              <a:rPr lang="de-DE" smtClean="0"/>
+              <a:rPr lang="de-DE"/>
               <a:t>Zweite Ebene</a:t>
             </a:r>
           </a:p>
           <a:p>
             <a:pPr lvl="2"/>
             <a:r>
-              <a:rPr lang="de-DE" smtClean="0"/>
+              <a:rPr lang="de-DE"/>
               <a:t>Dritte Ebene</a:t>
             </a:r>
           </a:p>
           <a:p>
             <a:pPr lvl="3"/>
             <a:r>
-              <a:rPr lang="de-DE" smtClean="0"/>
+              <a:rPr lang="de-DE"/>
               <a:t>Vierte Ebene</a:t>
             </a:r>
           </a:p>
           <a:p>
             <a:pPr lvl="4"/>
             <a:r>
-              <a:rPr lang="de-DE" smtClean="0"/>
+              <a:rPr lang="de-DE"/>
               <a:t>Fünfte Ebene</a:t>
             </a:r>
-            <a:endParaRPr lang="de-DE"/>
           </a:p>
         </p:txBody>
       </p:sp>
@@ -2662,7 +2671,7 @@
           <a:p>
             <a:fld id="{1BA50D42-C9CD-4801-B293-61D1F53EC57E}" type="datetimeFigureOut">
               <a:rPr lang="de-DE" smtClean="0"/>
-              <a:t>14.09.2006</a:t>
+              <a:t>03.02.2022</a:t>
             </a:fld>
             <a:endParaRPr lang="de-DE"/>
           </a:p>
@@ -3015,15 +3024,1455 @@
 </p:sldMaster>
 </file>
 
+<file path=ppt/slides/slide1.xml><?xml version="1.0" encoding="utf-8"?>
+<p:sld xmlns:a="http://schemas.openxmlformats.org/drawingml/2006/main" xmlns:r="http://schemas.openxmlformats.org/officeDocument/2006/relationships" xmlns:p="http://schemas.openxmlformats.org/presentationml/2006/main">
+  <p:cSld>
+    <p:spTree>
+      <p:nvGrpSpPr>
+        <p:cNvPr id="1" name=""/>
+        <p:cNvGrpSpPr/>
+        <p:nvPr/>
+      </p:nvGrpSpPr>
+      <p:grpSpPr>
+        <a:xfrm>
+          <a:off x="0" y="0"/>
+          <a:ext cx="0" cy="0"/>
+          <a:chOff x="0" y="0"/>
+          <a:chExt cx="0" cy="0"/>
+        </a:xfrm>
+      </p:grpSpPr>
+      <p:sp>
+        <p:nvSpPr>
+          <p:cNvPr id="2" name="Titel 1">
+            <a:extLst>
+              <a:ext uri="{FF2B5EF4-FFF2-40B4-BE49-F238E27FC236}">
+                <a16:creationId xmlns:a16="http://schemas.microsoft.com/office/drawing/2014/main" id="{560AEB13-76C7-4DF7-8874-B49F86F610C7}"/>
+              </a:ext>
+            </a:extLst>
+          </p:cNvPr>
+          <p:cNvSpPr>
+            <a:spLocks noGrp="1"/>
+          </p:cNvSpPr>
+          <p:nvPr>
+            <p:ph type="ctrTitle"/>
+          </p:nvPr>
+        </p:nvSpPr>
+        <p:spPr/>
+        <p:txBody>
+          <a:bodyPr/>
+          <a:lstStyle/>
+          <a:p>
+            <a:r>
+              <a:rPr lang="de-CH" dirty="0"/>
+              <a:t>Home Automation</a:t>
+            </a:r>
+          </a:p>
+        </p:txBody>
+      </p:sp>
+      <p:sp>
+        <p:nvSpPr>
+          <p:cNvPr id="3" name="Untertitel 2">
+            <a:extLst>
+              <a:ext uri="{FF2B5EF4-FFF2-40B4-BE49-F238E27FC236}">
+                <a16:creationId xmlns:a16="http://schemas.microsoft.com/office/drawing/2014/main" id="{557B7933-9F9B-4E66-8467-906276E91723}"/>
+              </a:ext>
+            </a:extLst>
+          </p:cNvPr>
+          <p:cNvSpPr>
+            <a:spLocks noGrp="1"/>
+          </p:cNvSpPr>
+          <p:nvPr>
+            <p:ph type="subTitle" idx="1"/>
+          </p:nvPr>
+        </p:nvSpPr>
+        <p:spPr/>
+        <p:txBody>
+          <a:bodyPr/>
+          <a:lstStyle/>
+          <a:p>
+            <a:r>
+              <a:rPr lang="de-CH" dirty="0"/>
+              <a:t>Lukas Züger, Marko Milosavljevic, Abdu </a:t>
+            </a:r>
+            <a:r>
+              <a:rPr lang="de-CH" dirty="0" err="1"/>
+              <a:t>Shehata</a:t>
+            </a:r>
+            <a:endParaRPr lang="de-CH" dirty="0"/>
+          </a:p>
+          <a:p>
+            <a:endParaRPr lang="de-CH" dirty="0"/>
+          </a:p>
+        </p:txBody>
+      </p:sp>
+    </p:spTree>
+    <p:extLst>
+      <p:ext uri="{BB962C8B-B14F-4D97-AF65-F5344CB8AC3E}">
+        <p14:creationId xmlns:p14="http://schemas.microsoft.com/office/powerpoint/2010/main" val="3509030373"/>
+      </p:ext>
+    </p:extLst>
+  </p:cSld>
+  <p:clrMapOvr>
+    <a:masterClrMapping/>
+  </p:clrMapOvr>
+</p:sld>
+</file>
+
+<file path=ppt/slides/slide10.xml><?xml version="1.0" encoding="utf-8"?>
+<p:sld xmlns:a="http://schemas.openxmlformats.org/drawingml/2006/main" xmlns:r="http://schemas.openxmlformats.org/officeDocument/2006/relationships" xmlns:p="http://schemas.openxmlformats.org/presentationml/2006/main">
+  <p:cSld>
+    <p:spTree>
+      <p:nvGrpSpPr>
+        <p:cNvPr id="1" name=""/>
+        <p:cNvGrpSpPr/>
+        <p:nvPr/>
+      </p:nvGrpSpPr>
+      <p:grpSpPr>
+        <a:xfrm>
+          <a:off x="0" y="0"/>
+          <a:ext cx="0" cy="0"/>
+          <a:chOff x="0" y="0"/>
+          <a:chExt cx="0" cy="0"/>
+        </a:xfrm>
+      </p:grpSpPr>
+      <p:sp>
+        <p:nvSpPr>
+          <p:cNvPr id="2" name="Titel 1">
+            <a:extLst>
+              <a:ext uri="{FF2B5EF4-FFF2-40B4-BE49-F238E27FC236}">
+                <a16:creationId xmlns:a16="http://schemas.microsoft.com/office/drawing/2014/main" id="{DDC08123-E69E-4297-B707-9817ADB53D5D}"/>
+              </a:ext>
+            </a:extLst>
+          </p:cNvPr>
+          <p:cNvSpPr>
+            <a:spLocks noGrp="1"/>
+          </p:cNvSpPr>
+          <p:nvPr>
+            <p:ph type="title"/>
+          </p:nvPr>
+        </p:nvSpPr>
+        <p:spPr/>
+        <p:txBody>
+          <a:bodyPr/>
+          <a:lstStyle/>
+          <a:p>
+            <a:r>
+              <a:rPr lang="de-CH" dirty="0"/>
+              <a:t>Probleme im verlaufe des Projekts</a:t>
+            </a:r>
+          </a:p>
+        </p:txBody>
+      </p:sp>
+      <p:sp>
+        <p:nvSpPr>
+          <p:cNvPr id="3" name="Inhaltsplatzhalter 2">
+            <a:extLst>
+              <a:ext uri="{FF2B5EF4-FFF2-40B4-BE49-F238E27FC236}">
+                <a16:creationId xmlns:a16="http://schemas.microsoft.com/office/drawing/2014/main" id="{9B8EA265-5357-4130-A452-9C2A979F4D83}"/>
+              </a:ext>
+            </a:extLst>
+          </p:cNvPr>
+          <p:cNvSpPr>
+            <a:spLocks noGrp="1"/>
+          </p:cNvSpPr>
+          <p:nvPr>
+            <p:ph idx="1"/>
+          </p:nvPr>
+        </p:nvSpPr>
+        <p:spPr/>
+        <p:txBody>
+          <a:bodyPr/>
+          <a:lstStyle/>
+          <a:p>
+            <a:r>
+              <a:rPr lang="de-CH" dirty="0"/>
+              <a:t>Ipv6</a:t>
+            </a:r>
+          </a:p>
+          <a:p>
+            <a:r>
+              <a:rPr lang="de-CH" dirty="0"/>
+              <a:t>Performance Probleme wegen Raspberry</a:t>
+            </a:r>
+          </a:p>
+          <a:p>
+            <a:r>
+              <a:rPr lang="de-CH" dirty="0"/>
+              <a:t>Personenerkennung mit </a:t>
+            </a:r>
+            <a:r>
+              <a:rPr lang="de-CH" dirty="0" err="1"/>
+              <a:t>full</a:t>
+            </a:r>
+            <a:r>
+              <a:rPr lang="de-CH" dirty="0"/>
+              <a:t> </a:t>
+            </a:r>
+            <a:r>
+              <a:rPr lang="de-CH" dirty="0" err="1"/>
+              <a:t>body</a:t>
+            </a:r>
+            <a:r>
+              <a:rPr lang="de-CH" dirty="0"/>
+              <a:t> und Gesicht</a:t>
+            </a:r>
+          </a:p>
+          <a:p>
+            <a:pPr lvl="1"/>
+            <a:r>
+              <a:rPr lang="de-CH" dirty="0"/>
+              <a:t>Seitliche </a:t>
+            </a:r>
+            <a:r>
+              <a:rPr lang="de-CH" dirty="0" err="1"/>
+              <a:t>ansicht</a:t>
+            </a:r>
+            <a:r>
+              <a:rPr lang="de-CH" dirty="0"/>
+              <a:t> ist noch nicht gut gelöst</a:t>
+            </a:r>
+          </a:p>
+          <a:p>
+            <a:r>
+              <a:rPr lang="de-CH" dirty="0" err="1"/>
+              <a:t>Harmony</a:t>
+            </a:r>
+            <a:r>
+              <a:rPr lang="de-CH" dirty="0"/>
+              <a:t> Hub unterstützt nur 2.4 GHz</a:t>
+            </a:r>
+          </a:p>
+          <a:p>
+            <a:pPr lvl="1"/>
+            <a:r>
+              <a:rPr lang="de-CH" dirty="0"/>
+              <a:t>5 GHz = keine Verbindung</a:t>
+            </a:r>
+          </a:p>
+        </p:txBody>
+      </p:sp>
+    </p:spTree>
+    <p:extLst>
+      <p:ext uri="{BB962C8B-B14F-4D97-AF65-F5344CB8AC3E}">
+        <p14:creationId xmlns:p14="http://schemas.microsoft.com/office/powerpoint/2010/main" val="1077278765"/>
+      </p:ext>
+    </p:extLst>
+  </p:cSld>
+  <p:clrMapOvr>
+    <a:masterClrMapping/>
+  </p:clrMapOvr>
+</p:sld>
+</file>
+
+<file path=ppt/slides/slide11.xml><?xml version="1.0" encoding="utf-8"?>
+<p:sld xmlns:a="http://schemas.openxmlformats.org/drawingml/2006/main" xmlns:r="http://schemas.openxmlformats.org/officeDocument/2006/relationships" xmlns:p="http://schemas.openxmlformats.org/presentationml/2006/main">
+  <p:cSld>
+    <p:spTree>
+      <p:nvGrpSpPr>
+        <p:cNvPr id="1" name=""/>
+        <p:cNvGrpSpPr/>
+        <p:nvPr/>
+      </p:nvGrpSpPr>
+      <p:grpSpPr>
+        <a:xfrm>
+          <a:off x="0" y="0"/>
+          <a:ext cx="0" cy="0"/>
+          <a:chOff x="0" y="0"/>
+          <a:chExt cx="0" cy="0"/>
+        </a:xfrm>
+      </p:grpSpPr>
+      <p:sp>
+        <p:nvSpPr>
+          <p:cNvPr id="2" name="Titel 1">
+            <a:extLst>
+              <a:ext uri="{FF2B5EF4-FFF2-40B4-BE49-F238E27FC236}">
+                <a16:creationId xmlns:a16="http://schemas.microsoft.com/office/drawing/2014/main" id="{B100F170-CCBE-4A4D-82AE-FF65D20479DC}"/>
+              </a:ext>
+            </a:extLst>
+          </p:cNvPr>
+          <p:cNvSpPr>
+            <a:spLocks noGrp="1"/>
+          </p:cNvSpPr>
+          <p:nvPr>
+            <p:ph type="title"/>
+          </p:nvPr>
+        </p:nvSpPr>
+        <p:spPr/>
+        <p:txBody>
+          <a:bodyPr/>
+          <a:lstStyle/>
+          <a:p>
+            <a:r>
+              <a:rPr lang="de-CH" dirty="0"/>
+              <a:t>Demo Video</a:t>
+            </a:r>
+          </a:p>
+        </p:txBody>
+      </p:sp>
+      <p:sp>
+        <p:nvSpPr>
+          <p:cNvPr id="3" name="Inhaltsplatzhalter 2">
+            <a:extLst>
+              <a:ext uri="{FF2B5EF4-FFF2-40B4-BE49-F238E27FC236}">
+                <a16:creationId xmlns:a16="http://schemas.microsoft.com/office/drawing/2014/main" id="{5F7BEAE4-4E40-4340-B559-C32744D060FE}"/>
+              </a:ext>
+            </a:extLst>
+          </p:cNvPr>
+          <p:cNvSpPr>
+            <a:spLocks noGrp="1"/>
+          </p:cNvSpPr>
+          <p:nvPr>
+            <p:ph idx="1"/>
+          </p:nvPr>
+        </p:nvSpPr>
+        <p:spPr/>
+        <p:txBody>
+          <a:bodyPr/>
+          <a:lstStyle/>
+          <a:p>
+            <a:r>
+              <a:rPr lang="de-CH" dirty="0"/>
+              <a:t>Muss noch gedreht werden</a:t>
+            </a:r>
+          </a:p>
+        </p:txBody>
+      </p:sp>
+    </p:spTree>
+    <p:extLst>
+      <p:ext uri="{BB962C8B-B14F-4D97-AF65-F5344CB8AC3E}">
+        <p14:creationId xmlns:p14="http://schemas.microsoft.com/office/powerpoint/2010/main" val="2053189695"/>
+      </p:ext>
+    </p:extLst>
+  </p:cSld>
+  <p:clrMapOvr>
+    <a:masterClrMapping/>
+  </p:clrMapOvr>
+</p:sld>
+</file>
+
+<file path=ppt/slides/slide12.xml><?xml version="1.0" encoding="utf-8"?>
+<p:sld xmlns:a="http://schemas.openxmlformats.org/drawingml/2006/main" xmlns:r="http://schemas.openxmlformats.org/officeDocument/2006/relationships" xmlns:p="http://schemas.openxmlformats.org/presentationml/2006/main">
+  <p:cSld>
+    <p:spTree>
+      <p:nvGrpSpPr>
+        <p:cNvPr id="1" name=""/>
+        <p:cNvGrpSpPr/>
+        <p:nvPr/>
+      </p:nvGrpSpPr>
+      <p:grpSpPr>
+        <a:xfrm>
+          <a:off x="0" y="0"/>
+          <a:ext cx="0" cy="0"/>
+          <a:chOff x="0" y="0"/>
+          <a:chExt cx="0" cy="0"/>
+        </a:xfrm>
+      </p:grpSpPr>
+      <p:sp>
+        <p:nvSpPr>
+          <p:cNvPr id="2" name="Titel 1">
+            <a:extLst>
+              <a:ext uri="{FF2B5EF4-FFF2-40B4-BE49-F238E27FC236}">
+                <a16:creationId xmlns:a16="http://schemas.microsoft.com/office/drawing/2014/main" id="{BD7FD0FB-400F-4D53-8C51-F0F5EDE0D1B8}"/>
+              </a:ext>
+            </a:extLst>
+          </p:cNvPr>
+          <p:cNvSpPr>
+            <a:spLocks noGrp="1"/>
+          </p:cNvSpPr>
+          <p:nvPr>
+            <p:ph type="title"/>
+          </p:nvPr>
+        </p:nvSpPr>
+        <p:spPr/>
+        <p:txBody>
+          <a:bodyPr/>
+          <a:lstStyle/>
+          <a:p>
+            <a:r>
+              <a:rPr lang="de-CH" dirty="0"/>
+              <a:t>Vielen Dank / Fragen</a:t>
+            </a:r>
+          </a:p>
+        </p:txBody>
+      </p:sp>
+      <p:sp>
+        <p:nvSpPr>
+          <p:cNvPr id="3" name="Inhaltsplatzhalter 2">
+            <a:extLst>
+              <a:ext uri="{FF2B5EF4-FFF2-40B4-BE49-F238E27FC236}">
+                <a16:creationId xmlns:a16="http://schemas.microsoft.com/office/drawing/2014/main" id="{AAE54111-DC0F-409D-B995-BB24D1206C94}"/>
+              </a:ext>
+            </a:extLst>
+          </p:cNvPr>
+          <p:cNvSpPr>
+            <a:spLocks noGrp="1"/>
+          </p:cNvSpPr>
+          <p:nvPr>
+            <p:ph idx="1"/>
+          </p:nvPr>
+        </p:nvSpPr>
+        <p:spPr/>
+        <p:txBody>
+          <a:bodyPr/>
+          <a:lstStyle/>
+          <a:p>
+            <a:endParaRPr lang="de-CH"/>
+          </a:p>
+        </p:txBody>
+      </p:sp>
+    </p:spTree>
+    <p:extLst>
+      <p:ext uri="{BB962C8B-B14F-4D97-AF65-F5344CB8AC3E}">
+        <p14:creationId xmlns:p14="http://schemas.microsoft.com/office/powerpoint/2010/main" val="2677199399"/>
+      </p:ext>
+    </p:extLst>
+  </p:cSld>
+  <p:clrMapOvr>
+    <a:masterClrMapping/>
+  </p:clrMapOvr>
+</p:sld>
+</file>
+
+<file path=ppt/slides/slide2.xml><?xml version="1.0" encoding="utf-8"?>
+<p:sld xmlns:a="http://schemas.openxmlformats.org/drawingml/2006/main" xmlns:r="http://schemas.openxmlformats.org/officeDocument/2006/relationships" xmlns:p="http://schemas.openxmlformats.org/presentationml/2006/main">
+  <p:cSld>
+    <p:spTree>
+      <p:nvGrpSpPr>
+        <p:cNvPr id="1" name=""/>
+        <p:cNvGrpSpPr/>
+        <p:nvPr/>
+      </p:nvGrpSpPr>
+      <p:grpSpPr>
+        <a:xfrm>
+          <a:off x="0" y="0"/>
+          <a:ext cx="0" cy="0"/>
+          <a:chOff x="0" y="0"/>
+          <a:chExt cx="0" cy="0"/>
+        </a:xfrm>
+      </p:grpSpPr>
+      <p:sp>
+        <p:nvSpPr>
+          <p:cNvPr id="2" name="Titel 1">
+            <a:extLst>
+              <a:ext uri="{FF2B5EF4-FFF2-40B4-BE49-F238E27FC236}">
+                <a16:creationId xmlns:a16="http://schemas.microsoft.com/office/drawing/2014/main" id="{7DA709D1-0B41-4B04-BBFC-54BCC44BEE4E}"/>
+              </a:ext>
+            </a:extLst>
+          </p:cNvPr>
+          <p:cNvSpPr>
+            <a:spLocks noGrp="1"/>
+          </p:cNvSpPr>
+          <p:nvPr>
+            <p:ph type="title"/>
+          </p:nvPr>
+        </p:nvSpPr>
+        <p:spPr/>
+        <p:txBody>
+          <a:bodyPr/>
+          <a:lstStyle/>
+          <a:p>
+            <a:r>
+              <a:rPr lang="de-CH" dirty="0"/>
+              <a:t>Überblick</a:t>
+            </a:r>
+          </a:p>
+        </p:txBody>
+      </p:sp>
+      <p:sp>
+        <p:nvSpPr>
+          <p:cNvPr id="3" name="Inhaltsplatzhalter 2">
+            <a:extLst>
+              <a:ext uri="{FF2B5EF4-FFF2-40B4-BE49-F238E27FC236}">
+                <a16:creationId xmlns:a16="http://schemas.microsoft.com/office/drawing/2014/main" id="{EDBD3885-95C9-48B6-B393-D618DB9C9181}"/>
+              </a:ext>
+            </a:extLst>
+          </p:cNvPr>
+          <p:cNvSpPr>
+            <a:spLocks noGrp="1"/>
+          </p:cNvSpPr>
+          <p:nvPr>
+            <p:ph idx="1"/>
+          </p:nvPr>
+        </p:nvSpPr>
+        <p:spPr/>
+        <p:txBody>
+          <a:bodyPr/>
+          <a:lstStyle/>
+          <a:p>
+            <a:r>
+              <a:rPr lang="de-CH" dirty="0"/>
+              <a:t>Agenda</a:t>
+            </a:r>
+          </a:p>
+        </p:txBody>
+      </p:sp>
+    </p:spTree>
+    <p:extLst>
+      <p:ext uri="{BB962C8B-B14F-4D97-AF65-F5344CB8AC3E}">
+        <p14:creationId xmlns:p14="http://schemas.microsoft.com/office/powerpoint/2010/main" val="2304855106"/>
+      </p:ext>
+    </p:extLst>
+  </p:cSld>
+  <p:clrMapOvr>
+    <a:masterClrMapping/>
+  </p:clrMapOvr>
+</p:sld>
+</file>
+
+<file path=ppt/slides/slide3.xml><?xml version="1.0" encoding="utf-8"?>
+<p:sld xmlns:a="http://schemas.openxmlformats.org/drawingml/2006/main" xmlns:r="http://schemas.openxmlformats.org/officeDocument/2006/relationships" xmlns:p="http://schemas.openxmlformats.org/presentationml/2006/main">
+  <p:cSld>
+    <p:spTree>
+      <p:nvGrpSpPr>
+        <p:cNvPr id="1" name=""/>
+        <p:cNvGrpSpPr/>
+        <p:nvPr/>
+      </p:nvGrpSpPr>
+      <p:grpSpPr>
+        <a:xfrm>
+          <a:off x="0" y="0"/>
+          <a:ext cx="0" cy="0"/>
+          <a:chOff x="0" y="0"/>
+          <a:chExt cx="0" cy="0"/>
+        </a:xfrm>
+      </p:grpSpPr>
+      <p:sp>
+        <p:nvSpPr>
+          <p:cNvPr id="2" name="Titel 1">
+            <a:extLst>
+              <a:ext uri="{FF2B5EF4-FFF2-40B4-BE49-F238E27FC236}">
+                <a16:creationId xmlns:a16="http://schemas.microsoft.com/office/drawing/2014/main" id="{A5CC39BA-0D8A-4D97-A3AB-4086BCE601CC}"/>
+              </a:ext>
+            </a:extLst>
+          </p:cNvPr>
+          <p:cNvSpPr>
+            <a:spLocks noGrp="1"/>
+          </p:cNvSpPr>
+          <p:nvPr>
+            <p:ph type="title"/>
+          </p:nvPr>
+        </p:nvSpPr>
+        <p:spPr/>
+        <p:txBody>
+          <a:bodyPr/>
+          <a:lstStyle/>
+          <a:p>
+            <a:r>
+              <a:rPr lang="de-CH" dirty="0"/>
+              <a:t>Team</a:t>
+            </a:r>
+          </a:p>
+        </p:txBody>
+      </p:sp>
+      <p:sp>
+        <p:nvSpPr>
+          <p:cNvPr id="3" name="Inhaltsplatzhalter 2">
+            <a:extLst>
+              <a:ext uri="{FF2B5EF4-FFF2-40B4-BE49-F238E27FC236}">
+                <a16:creationId xmlns:a16="http://schemas.microsoft.com/office/drawing/2014/main" id="{BEA8AB5F-0006-4B47-BB7C-2F51651A993F}"/>
+              </a:ext>
+            </a:extLst>
+          </p:cNvPr>
+          <p:cNvSpPr>
+            <a:spLocks noGrp="1"/>
+          </p:cNvSpPr>
+          <p:nvPr>
+            <p:ph idx="1"/>
+          </p:nvPr>
+        </p:nvSpPr>
+        <p:spPr/>
+        <p:txBody>
+          <a:bodyPr/>
+          <a:lstStyle/>
+          <a:p>
+            <a:r>
+              <a:rPr lang="de-CH" dirty="0"/>
+              <a:t>Team </a:t>
+            </a:r>
+            <a:r>
+              <a:rPr lang="de-CH" dirty="0" err="1"/>
+              <a:t>präsentation</a:t>
+            </a:r>
+            <a:r>
+              <a:rPr lang="de-CH" dirty="0"/>
+              <a:t> </a:t>
+            </a:r>
+            <a:r>
+              <a:rPr lang="de-CH" dirty="0">
+                <a:sym typeface="Wingdings" panose="05000000000000000000" pitchFamily="2" charset="2"/>
+              </a:rPr>
+              <a:t> </a:t>
+            </a:r>
+            <a:r>
+              <a:rPr lang="de-CH" dirty="0" err="1">
+                <a:sym typeface="Wingdings" panose="05000000000000000000" pitchFamily="2" charset="2"/>
+              </a:rPr>
+              <a:t>zuständigkeit</a:t>
+            </a:r>
+            <a:endParaRPr lang="de-CH" dirty="0">
+              <a:sym typeface="Wingdings" panose="05000000000000000000" pitchFamily="2" charset="2"/>
+            </a:endParaRPr>
+          </a:p>
+          <a:p>
+            <a:r>
+              <a:rPr lang="de-CH" dirty="0">
+                <a:sym typeface="Wingdings" panose="05000000000000000000" pitchFamily="2" charset="2"/>
+              </a:rPr>
+              <a:t>Abdu -&gt; technisches </a:t>
+            </a:r>
+            <a:r>
+              <a:rPr lang="de-CH" dirty="0" err="1">
+                <a:sym typeface="Wingdings" panose="05000000000000000000" pitchFamily="2" charset="2"/>
+              </a:rPr>
+              <a:t>mastermind</a:t>
+            </a:r>
+            <a:endParaRPr lang="de-CH" dirty="0">
+              <a:sym typeface="Wingdings" panose="05000000000000000000" pitchFamily="2" charset="2"/>
+            </a:endParaRPr>
+          </a:p>
+          <a:p>
+            <a:r>
+              <a:rPr lang="de-CH" dirty="0">
+                <a:sym typeface="Wingdings" panose="05000000000000000000" pitchFamily="2" charset="2"/>
+              </a:rPr>
+              <a:t>Marko -&gt; Home </a:t>
+            </a:r>
+            <a:r>
+              <a:rPr lang="de-CH" dirty="0" err="1">
+                <a:sym typeface="Wingdings" panose="05000000000000000000" pitchFamily="2" charset="2"/>
+              </a:rPr>
+              <a:t>assistant</a:t>
+            </a:r>
+            <a:r>
+              <a:rPr lang="de-CH" dirty="0">
+                <a:sym typeface="Wingdings" panose="05000000000000000000" pitchFamily="2" charset="2"/>
+              </a:rPr>
+              <a:t> </a:t>
+            </a:r>
+            <a:r>
+              <a:rPr lang="de-CH" dirty="0" err="1">
+                <a:sym typeface="Wingdings" panose="05000000000000000000" pitchFamily="2" charset="2"/>
+              </a:rPr>
+              <a:t>konfiguration</a:t>
+            </a:r>
+            <a:r>
+              <a:rPr lang="de-CH" dirty="0">
+                <a:sym typeface="Wingdings" panose="05000000000000000000" pitchFamily="2" charset="2"/>
+              </a:rPr>
+              <a:t> </a:t>
+            </a:r>
+          </a:p>
+          <a:p>
+            <a:r>
+              <a:rPr lang="de-CH" dirty="0">
+                <a:sym typeface="Wingdings" panose="05000000000000000000" pitchFamily="2" charset="2"/>
+              </a:rPr>
+              <a:t>Lukas -&gt; </a:t>
+            </a:r>
+            <a:r>
+              <a:rPr lang="de-CH" dirty="0" err="1">
+                <a:sym typeface="Wingdings" panose="05000000000000000000" pitchFamily="2" charset="2"/>
+              </a:rPr>
+              <a:t>Harmony</a:t>
+            </a:r>
+            <a:r>
+              <a:rPr lang="de-CH" dirty="0">
+                <a:sym typeface="Wingdings" panose="05000000000000000000" pitchFamily="2" charset="2"/>
+              </a:rPr>
+              <a:t> Hub </a:t>
+            </a:r>
+            <a:r>
+              <a:rPr lang="de-CH" dirty="0" err="1">
+                <a:sym typeface="Wingdings" panose="05000000000000000000" pitchFamily="2" charset="2"/>
+              </a:rPr>
+              <a:t>konfiguration</a:t>
+            </a:r>
+            <a:r>
+              <a:rPr lang="de-CH" dirty="0">
+                <a:sym typeface="Wingdings" panose="05000000000000000000" pitchFamily="2" charset="2"/>
+              </a:rPr>
+              <a:t> </a:t>
+            </a:r>
+          </a:p>
+          <a:p>
+            <a:r>
+              <a:rPr lang="de-CH" dirty="0"/>
+              <a:t>(Bilder von uns)</a:t>
+            </a:r>
+          </a:p>
+        </p:txBody>
+      </p:sp>
+    </p:spTree>
+    <p:extLst>
+      <p:ext uri="{BB962C8B-B14F-4D97-AF65-F5344CB8AC3E}">
+        <p14:creationId xmlns:p14="http://schemas.microsoft.com/office/powerpoint/2010/main" val="3776744314"/>
+      </p:ext>
+    </p:extLst>
+  </p:cSld>
+  <p:clrMapOvr>
+    <a:masterClrMapping/>
+  </p:clrMapOvr>
+</p:sld>
+</file>
+
+<file path=ppt/slides/slide4.xml><?xml version="1.0" encoding="utf-8"?>
+<p:sld xmlns:a="http://schemas.openxmlformats.org/drawingml/2006/main" xmlns:r="http://schemas.openxmlformats.org/officeDocument/2006/relationships" xmlns:p="http://schemas.openxmlformats.org/presentationml/2006/main">
+  <p:cSld>
+    <p:spTree>
+      <p:nvGrpSpPr>
+        <p:cNvPr id="1" name=""/>
+        <p:cNvGrpSpPr/>
+        <p:nvPr/>
+      </p:nvGrpSpPr>
+      <p:grpSpPr>
+        <a:xfrm>
+          <a:off x="0" y="0"/>
+          <a:ext cx="0" cy="0"/>
+          <a:chOff x="0" y="0"/>
+          <a:chExt cx="0" cy="0"/>
+        </a:xfrm>
+      </p:grpSpPr>
+      <p:sp>
+        <p:nvSpPr>
+          <p:cNvPr id="2" name="Titel 1">
+            <a:extLst>
+              <a:ext uri="{FF2B5EF4-FFF2-40B4-BE49-F238E27FC236}">
+                <a16:creationId xmlns:a16="http://schemas.microsoft.com/office/drawing/2014/main" id="{B7DA4A3F-E29C-494C-901F-A2E102C24095}"/>
+              </a:ext>
+            </a:extLst>
+          </p:cNvPr>
+          <p:cNvSpPr>
+            <a:spLocks noGrp="1"/>
+          </p:cNvSpPr>
+          <p:nvPr>
+            <p:ph type="title"/>
+          </p:nvPr>
+        </p:nvSpPr>
+        <p:spPr/>
+        <p:txBody>
+          <a:bodyPr/>
+          <a:lstStyle/>
+          <a:p>
+            <a:r>
+              <a:rPr lang="de-CH" dirty="0"/>
+              <a:t>Kurz Vorstellung der Projektidee</a:t>
+            </a:r>
+          </a:p>
+        </p:txBody>
+      </p:sp>
+      <p:sp>
+        <p:nvSpPr>
+          <p:cNvPr id="3" name="Inhaltsplatzhalter 2">
+            <a:extLst>
+              <a:ext uri="{FF2B5EF4-FFF2-40B4-BE49-F238E27FC236}">
+                <a16:creationId xmlns:a16="http://schemas.microsoft.com/office/drawing/2014/main" id="{3A0C84D3-74F5-4412-B4E2-7A14E31758E8}"/>
+              </a:ext>
+            </a:extLst>
+          </p:cNvPr>
+          <p:cNvSpPr>
+            <a:spLocks noGrp="1"/>
+          </p:cNvSpPr>
+          <p:nvPr>
+            <p:ph idx="1"/>
+          </p:nvPr>
+        </p:nvSpPr>
+        <p:spPr/>
+        <p:txBody>
+          <a:bodyPr/>
+          <a:lstStyle/>
+          <a:p>
+            <a:r>
+              <a:rPr lang="de-CH" dirty="0"/>
+              <a:t>Projekt Vorstellung</a:t>
+            </a:r>
+          </a:p>
+          <a:p>
+            <a:r>
+              <a:rPr lang="de-CH" dirty="0"/>
+              <a:t>Ziele</a:t>
+            </a:r>
+          </a:p>
+        </p:txBody>
+      </p:sp>
+    </p:spTree>
+    <p:extLst>
+      <p:ext uri="{BB962C8B-B14F-4D97-AF65-F5344CB8AC3E}">
+        <p14:creationId xmlns:p14="http://schemas.microsoft.com/office/powerpoint/2010/main" val="127215135"/>
+      </p:ext>
+    </p:extLst>
+  </p:cSld>
+  <p:clrMapOvr>
+    <a:masterClrMapping/>
+  </p:clrMapOvr>
+</p:sld>
+</file>
+
+<file path=ppt/slides/slide5.xml><?xml version="1.0" encoding="utf-8"?>
+<p:sld xmlns:a="http://schemas.openxmlformats.org/drawingml/2006/main" xmlns:r="http://schemas.openxmlformats.org/officeDocument/2006/relationships" xmlns:p="http://schemas.openxmlformats.org/presentationml/2006/main">
+  <p:cSld>
+    <p:spTree>
+      <p:nvGrpSpPr>
+        <p:cNvPr id="1" name=""/>
+        <p:cNvGrpSpPr/>
+        <p:nvPr/>
+      </p:nvGrpSpPr>
+      <p:grpSpPr>
+        <a:xfrm>
+          <a:off x="0" y="0"/>
+          <a:ext cx="0" cy="0"/>
+          <a:chOff x="0" y="0"/>
+          <a:chExt cx="0" cy="0"/>
+        </a:xfrm>
+      </p:grpSpPr>
+      <p:sp>
+        <p:nvSpPr>
+          <p:cNvPr id="2" name="Titel 1">
+            <a:extLst>
+              <a:ext uri="{FF2B5EF4-FFF2-40B4-BE49-F238E27FC236}">
+                <a16:creationId xmlns:a16="http://schemas.microsoft.com/office/drawing/2014/main" id="{691521C6-68F0-47DE-BF40-0A4F47C7D635}"/>
+              </a:ext>
+            </a:extLst>
+          </p:cNvPr>
+          <p:cNvSpPr>
+            <a:spLocks noGrp="1"/>
+          </p:cNvSpPr>
+          <p:nvPr>
+            <p:ph type="title"/>
+          </p:nvPr>
+        </p:nvSpPr>
+        <p:spPr/>
+        <p:txBody>
+          <a:bodyPr/>
+          <a:lstStyle/>
+          <a:p>
+            <a:r>
+              <a:rPr lang="de-CH" dirty="0" err="1"/>
+              <a:t>Funktions</a:t>
+            </a:r>
+            <a:r>
+              <a:rPr lang="de-CH" dirty="0"/>
+              <a:t> Überblick</a:t>
+            </a:r>
+          </a:p>
+        </p:txBody>
+      </p:sp>
+      <p:sp>
+        <p:nvSpPr>
+          <p:cNvPr id="3" name="Inhaltsplatzhalter 2">
+            <a:extLst>
+              <a:ext uri="{FF2B5EF4-FFF2-40B4-BE49-F238E27FC236}">
+                <a16:creationId xmlns:a16="http://schemas.microsoft.com/office/drawing/2014/main" id="{79784D07-267C-4660-A796-B42B8E22B636}"/>
+              </a:ext>
+            </a:extLst>
+          </p:cNvPr>
+          <p:cNvSpPr>
+            <a:spLocks noGrp="1"/>
+          </p:cNvSpPr>
+          <p:nvPr>
+            <p:ph idx="1"/>
+          </p:nvPr>
+        </p:nvSpPr>
+        <p:spPr/>
+        <p:txBody>
+          <a:bodyPr/>
+          <a:lstStyle/>
+          <a:p>
+            <a:r>
+              <a:rPr lang="de-CH" dirty="0"/>
+              <a:t>Raspberry 1 </a:t>
+            </a:r>
+            <a:r>
+              <a:rPr lang="de-CH" dirty="0">
+                <a:sym typeface="Wingdings" panose="05000000000000000000" pitchFamily="2" charset="2"/>
+              </a:rPr>
+              <a:t> Personenerkennung</a:t>
+            </a:r>
+          </a:p>
+          <a:p>
+            <a:r>
+              <a:rPr lang="de-CH" dirty="0">
+                <a:sym typeface="Wingdings" panose="05000000000000000000" pitchFamily="2" charset="2"/>
+              </a:rPr>
+              <a:t>Raspberry 2  Home </a:t>
+            </a:r>
+            <a:r>
+              <a:rPr lang="de-CH" dirty="0" err="1">
+                <a:sym typeface="Wingdings" panose="05000000000000000000" pitchFamily="2" charset="2"/>
+              </a:rPr>
+              <a:t>Assistant</a:t>
+            </a:r>
+            <a:r>
+              <a:rPr lang="de-CH" dirty="0">
+                <a:sym typeface="Wingdings" panose="05000000000000000000" pitchFamily="2" charset="2"/>
+              </a:rPr>
+              <a:t> OS</a:t>
+            </a:r>
+          </a:p>
+          <a:p>
+            <a:r>
+              <a:rPr lang="de-CH" dirty="0" err="1">
+                <a:sym typeface="Wingdings" panose="05000000000000000000" pitchFamily="2" charset="2"/>
+              </a:rPr>
+              <a:t>Harmony</a:t>
+            </a:r>
+            <a:r>
+              <a:rPr lang="de-CH" dirty="0">
+                <a:sym typeface="Wingdings" panose="05000000000000000000" pitchFamily="2" charset="2"/>
+              </a:rPr>
+              <a:t> Hub</a:t>
+            </a:r>
+          </a:p>
+          <a:p>
+            <a:r>
+              <a:rPr lang="de-CH" dirty="0">
+                <a:sym typeface="Wingdings" panose="05000000000000000000" pitchFamily="2" charset="2"/>
+              </a:rPr>
+              <a:t>(Diagramm form)</a:t>
+            </a:r>
+          </a:p>
+          <a:p>
+            <a:endParaRPr lang="de-CH" dirty="0"/>
+          </a:p>
+        </p:txBody>
+      </p:sp>
+    </p:spTree>
+    <p:extLst>
+      <p:ext uri="{BB962C8B-B14F-4D97-AF65-F5344CB8AC3E}">
+        <p14:creationId xmlns:p14="http://schemas.microsoft.com/office/powerpoint/2010/main" val="1531816222"/>
+      </p:ext>
+    </p:extLst>
+  </p:cSld>
+  <p:clrMapOvr>
+    <a:masterClrMapping/>
+  </p:clrMapOvr>
+</p:sld>
+</file>
+
+<file path=ppt/slides/slide6.xml><?xml version="1.0" encoding="utf-8"?>
+<p:sld xmlns:a="http://schemas.openxmlformats.org/drawingml/2006/main" xmlns:r="http://schemas.openxmlformats.org/officeDocument/2006/relationships" xmlns:p="http://schemas.openxmlformats.org/presentationml/2006/main">
+  <p:cSld>
+    <p:spTree>
+      <p:nvGrpSpPr>
+        <p:cNvPr id="1" name=""/>
+        <p:cNvGrpSpPr/>
+        <p:nvPr/>
+      </p:nvGrpSpPr>
+      <p:grpSpPr>
+        <a:xfrm>
+          <a:off x="0" y="0"/>
+          <a:ext cx="0" cy="0"/>
+          <a:chOff x="0" y="0"/>
+          <a:chExt cx="0" cy="0"/>
+        </a:xfrm>
+      </p:grpSpPr>
+      <p:sp>
+        <p:nvSpPr>
+          <p:cNvPr id="2" name="Titel 1">
+            <a:extLst>
+              <a:ext uri="{FF2B5EF4-FFF2-40B4-BE49-F238E27FC236}">
+                <a16:creationId xmlns:a16="http://schemas.microsoft.com/office/drawing/2014/main" id="{3756E398-E005-48A7-9D26-4E01E97C3021}"/>
+              </a:ext>
+            </a:extLst>
+          </p:cNvPr>
+          <p:cNvSpPr>
+            <a:spLocks noGrp="1"/>
+          </p:cNvSpPr>
+          <p:nvPr>
+            <p:ph type="title"/>
+          </p:nvPr>
+        </p:nvSpPr>
+        <p:spPr/>
+        <p:txBody>
+          <a:bodyPr/>
+          <a:lstStyle/>
+          <a:p>
+            <a:r>
+              <a:rPr lang="de-CH" dirty="0"/>
+              <a:t>Hardware</a:t>
+            </a:r>
+          </a:p>
+        </p:txBody>
+      </p:sp>
+      <p:sp>
+        <p:nvSpPr>
+          <p:cNvPr id="3" name="Inhaltsplatzhalter 2">
+            <a:extLst>
+              <a:ext uri="{FF2B5EF4-FFF2-40B4-BE49-F238E27FC236}">
+                <a16:creationId xmlns:a16="http://schemas.microsoft.com/office/drawing/2014/main" id="{B1016F21-14FF-4F0A-B14C-C313C22C2D53}"/>
+              </a:ext>
+            </a:extLst>
+          </p:cNvPr>
+          <p:cNvSpPr>
+            <a:spLocks noGrp="1"/>
+          </p:cNvSpPr>
+          <p:nvPr>
+            <p:ph idx="1"/>
+          </p:nvPr>
+        </p:nvSpPr>
+        <p:spPr/>
+        <p:txBody>
+          <a:bodyPr>
+            <a:normAutofit lnSpcReduction="10000"/>
+          </a:bodyPr>
+          <a:lstStyle/>
+          <a:p>
+            <a:r>
+              <a:rPr lang="de-CH" dirty="0"/>
+              <a:t>Personenerkennung</a:t>
+            </a:r>
+          </a:p>
+          <a:p>
+            <a:pPr lvl="1"/>
+            <a:r>
+              <a:rPr lang="de-CH" dirty="0"/>
+              <a:t>Raspberry Pi 4 Model B - 2GB</a:t>
+            </a:r>
+          </a:p>
+          <a:p>
+            <a:pPr lvl="2"/>
+            <a:r>
+              <a:rPr lang="de-CH" dirty="0"/>
+              <a:t>Display für Raspberry Pi</a:t>
+            </a:r>
+          </a:p>
+          <a:p>
+            <a:pPr lvl="1"/>
+            <a:r>
+              <a:rPr lang="de-CH" dirty="0"/>
+              <a:t>Kamera: Guo </a:t>
+            </a:r>
+            <a:r>
+              <a:rPr lang="de-CH" dirty="0" err="1"/>
+              <a:t>duo</a:t>
+            </a:r>
+            <a:r>
+              <a:rPr lang="de-CH" dirty="0"/>
+              <a:t> Webcam HD 1080</a:t>
+            </a:r>
+          </a:p>
+          <a:p>
+            <a:r>
+              <a:rPr lang="de-CH" dirty="0"/>
+              <a:t>Bedienung</a:t>
+            </a:r>
+          </a:p>
+          <a:p>
+            <a:pPr lvl="1"/>
+            <a:r>
+              <a:rPr lang="de-CH" dirty="0"/>
+              <a:t>Raspberry Pi 4 Model B – 2GB</a:t>
+            </a:r>
+          </a:p>
+          <a:p>
+            <a:pPr lvl="1"/>
+            <a:r>
+              <a:rPr lang="de-CH" dirty="0"/>
+              <a:t>Logitech </a:t>
+            </a:r>
+            <a:r>
+              <a:rPr lang="de-CH" dirty="0" err="1"/>
+              <a:t>Harmony</a:t>
+            </a:r>
+            <a:r>
+              <a:rPr lang="de-CH" dirty="0"/>
+              <a:t> Hub</a:t>
+            </a:r>
+          </a:p>
+          <a:p>
+            <a:pPr lvl="1"/>
+            <a:r>
+              <a:rPr lang="de-CH" dirty="0"/>
+              <a:t>Fernseher ohne Smartfunktionen</a:t>
+            </a:r>
+          </a:p>
+          <a:p>
+            <a:pPr lvl="1"/>
+            <a:r>
+              <a:rPr lang="de-CH" dirty="0">
+                <a:solidFill>
+                  <a:srgbClr val="FF0000"/>
+                </a:solidFill>
+              </a:rPr>
+              <a:t>(Alexa)</a:t>
+            </a:r>
+          </a:p>
+          <a:p>
+            <a:endParaRPr lang="de-CH" dirty="0"/>
+          </a:p>
+        </p:txBody>
+      </p:sp>
+    </p:spTree>
+    <p:extLst>
+      <p:ext uri="{BB962C8B-B14F-4D97-AF65-F5344CB8AC3E}">
+        <p14:creationId xmlns:p14="http://schemas.microsoft.com/office/powerpoint/2010/main" val="1969310644"/>
+      </p:ext>
+    </p:extLst>
+  </p:cSld>
+  <p:clrMapOvr>
+    <a:masterClrMapping/>
+  </p:clrMapOvr>
+</p:sld>
+</file>
+
+<file path=ppt/slides/slide7.xml><?xml version="1.0" encoding="utf-8"?>
+<p:sld xmlns:a="http://schemas.openxmlformats.org/drawingml/2006/main" xmlns:r="http://schemas.openxmlformats.org/officeDocument/2006/relationships" xmlns:p="http://schemas.openxmlformats.org/presentationml/2006/main">
+  <p:cSld>
+    <p:spTree>
+      <p:nvGrpSpPr>
+        <p:cNvPr id="1" name=""/>
+        <p:cNvGrpSpPr/>
+        <p:nvPr/>
+      </p:nvGrpSpPr>
+      <p:grpSpPr>
+        <a:xfrm>
+          <a:off x="0" y="0"/>
+          <a:ext cx="0" cy="0"/>
+          <a:chOff x="0" y="0"/>
+          <a:chExt cx="0" cy="0"/>
+        </a:xfrm>
+      </p:grpSpPr>
+      <p:sp>
+        <p:nvSpPr>
+          <p:cNvPr id="2" name="Titel 1">
+            <a:extLst>
+              <a:ext uri="{FF2B5EF4-FFF2-40B4-BE49-F238E27FC236}">
+                <a16:creationId xmlns:a16="http://schemas.microsoft.com/office/drawing/2014/main" id="{43F25713-4C2A-414A-B9A3-5BC67E0FF48B}"/>
+              </a:ext>
+            </a:extLst>
+          </p:cNvPr>
+          <p:cNvSpPr>
+            <a:spLocks noGrp="1"/>
+          </p:cNvSpPr>
+          <p:nvPr>
+            <p:ph type="title"/>
+          </p:nvPr>
+        </p:nvSpPr>
+        <p:spPr/>
+        <p:txBody>
+          <a:bodyPr/>
+          <a:lstStyle/>
+          <a:p>
+            <a:r>
+              <a:rPr lang="de-CH" dirty="0"/>
+              <a:t>Software</a:t>
+            </a:r>
+          </a:p>
+        </p:txBody>
+      </p:sp>
+      <p:sp>
+        <p:nvSpPr>
+          <p:cNvPr id="3" name="Inhaltsplatzhalter 2">
+            <a:extLst>
+              <a:ext uri="{FF2B5EF4-FFF2-40B4-BE49-F238E27FC236}">
+                <a16:creationId xmlns:a16="http://schemas.microsoft.com/office/drawing/2014/main" id="{3301ED44-7352-4D11-A527-F35A8B6331A2}"/>
+              </a:ext>
+            </a:extLst>
+          </p:cNvPr>
+          <p:cNvSpPr>
+            <a:spLocks noGrp="1"/>
+          </p:cNvSpPr>
+          <p:nvPr>
+            <p:ph idx="1"/>
+          </p:nvPr>
+        </p:nvSpPr>
+        <p:spPr/>
+        <p:txBody>
+          <a:bodyPr/>
+          <a:lstStyle/>
+          <a:p>
+            <a:r>
+              <a:rPr lang="de-CH" dirty="0"/>
+              <a:t>Personenerkennung</a:t>
+            </a:r>
+          </a:p>
+          <a:p>
+            <a:pPr lvl="1"/>
+            <a:r>
+              <a:rPr lang="de-CH" dirty="0" err="1"/>
+              <a:t>OpenCV</a:t>
+            </a:r>
+            <a:r>
+              <a:rPr lang="de-CH" dirty="0"/>
+              <a:t> </a:t>
+            </a:r>
+            <a:r>
+              <a:rPr lang="de-CH" dirty="0" err="1"/>
+              <a:t>library</a:t>
+            </a:r>
+            <a:endParaRPr lang="de-CH" dirty="0"/>
+          </a:p>
+          <a:p>
+            <a:pPr lvl="1"/>
+            <a:r>
+              <a:rPr lang="de-CH" dirty="0"/>
+              <a:t>Programmiersprache Python</a:t>
+            </a:r>
+          </a:p>
+          <a:p>
+            <a:pPr lvl="1"/>
+            <a:r>
+              <a:rPr lang="de-CH" dirty="0" err="1"/>
+              <a:t>Cascades</a:t>
+            </a:r>
+            <a:endParaRPr lang="de-CH" dirty="0"/>
+          </a:p>
+          <a:p>
+            <a:r>
+              <a:rPr lang="de-CH" dirty="0"/>
+              <a:t>Bedienung</a:t>
+            </a:r>
+          </a:p>
+          <a:p>
+            <a:pPr lvl="1"/>
+            <a:r>
+              <a:rPr lang="de-CH" dirty="0"/>
+              <a:t>Home </a:t>
+            </a:r>
+            <a:r>
+              <a:rPr lang="de-CH" dirty="0" err="1"/>
+              <a:t>Assistant</a:t>
+            </a:r>
+            <a:r>
+              <a:rPr lang="de-CH" dirty="0"/>
+              <a:t> OS</a:t>
+            </a:r>
+          </a:p>
+          <a:p>
+            <a:pPr lvl="1"/>
+            <a:endParaRPr lang="de-CH" dirty="0"/>
+          </a:p>
+        </p:txBody>
+      </p:sp>
+    </p:spTree>
+    <p:extLst>
+      <p:ext uri="{BB962C8B-B14F-4D97-AF65-F5344CB8AC3E}">
+        <p14:creationId xmlns:p14="http://schemas.microsoft.com/office/powerpoint/2010/main" val="3575338485"/>
+      </p:ext>
+    </p:extLst>
+  </p:cSld>
+  <p:clrMapOvr>
+    <a:masterClrMapping/>
+  </p:clrMapOvr>
+</p:sld>
+</file>
+
+<file path=ppt/slides/slide8.xml><?xml version="1.0" encoding="utf-8"?>
+<p:sld xmlns:a="http://schemas.openxmlformats.org/drawingml/2006/main" xmlns:r="http://schemas.openxmlformats.org/officeDocument/2006/relationships" xmlns:p="http://schemas.openxmlformats.org/presentationml/2006/main">
+  <p:cSld>
+    <p:spTree>
+      <p:nvGrpSpPr>
+        <p:cNvPr id="1" name=""/>
+        <p:cNvGrpSpPr/>
+        <p:nvPr/>
+      </p:nvGrpSpPr>
+      <p:grpSpPr>
+        <a:xfrm>
+          <a:off x="0" y="0"/>
+          <a:ext cx="0" cy="0"/>
+          <a:chOff x="0" y="0"/>
+          <a:chExt cx="0" cy="0"/>
+        </a:xfrm>
+      </p:grpSpPr>
+      <p:sp>
+        <p:nvSpPr>
+          <p:cNvPr id="2" name="Titel 1">
+            <a:extLst>
+              <a:ext uri="{FF2B5EF4-FFF2-40B4-BE49-F238E27FC236}">
+                <a16:creationId xmlns:a16="http://schemas.microsoft.com/office/drawing/2014/main" id="{B4BA6D4D-CDDA-4506-A918-694F53BDD35C}"/>
+              </a:ext>
+            </a:extLst>
+          </p:cNvPr>
+          <p:cNvSpPr>
+            <a:spLocks noGrp="1"/>
+          </p:cNvSpPr>
+          <p:nvPr>
+            <p:ph type="title"/>
+          </p:nvPr>
+        </p:nvSpPr>
+        <p:spPr/>
+        <p:txBody>
+          <a:bodyPr/>
+          <a:lstStyle/>
+          <a:p>
+            <a:r>
+              <a:rPr lang="de-CH" dirty="0" err="1"/>
+              <a:t>Harmony</a:t>
+            </a:r>
+            <a:r>
+              <a:rPr lang="de-CH" dirty="0"/>
+              <a:t> Hub</a:t>
+            </a:r>
+          </a:p>
+        </p:txBody>
+      </p:sp>
+      <p:sp>
+        <p:nvSpPr>
+          <p:cNvPr id="3" name="Inhaltsplatzhalter 2">
+            <a:extLst>
+              <a:ext uri="{FF2B5EF4-FFF2-40B4-BE49-F238E27FC236}">
+                <a16:creationId xmlns:a16="http://schemas.microsoft.com/office/drawing/2014/main" id="{72403E14-9D7B-4F4B-8877-E307BAA2F2B9}"/>
+              </a:ext>
+            </a:extLst>
+          </p:cNvPr>
+          <p:cNvSpPr>
+            <a:spLocks noGrp="1"/>
+          </p:cNvSpPr>
+          <p:nvPr>
+            <p:ph idx="1"/>
+          </p:nvPr>
+        </p:nvSpPr>
+        <p:spPr/>
+        <p:txBody>
+          <a:bodyPr/>
+          <a:lstStyle/>
+          <a:p>
+            <a:r>
+              <a:rPr lang="de-CH" dirty="0"/>
+              <a:t>Funktion</a:t>
+            </a:r>
+          </a:p>
+          <a:p>
+            <a:r>
+              <a:rPr lang="de-CH" dirty="0"/>
+              <a:t>Unsere spezifische Anwendung</a:t>
+            </a:r>
+          </a:p>
+        </p:txBody>
+      </p:sp>
+    </p:spTree>
+    <p:extLst>
+      <p:ext uri="{BB962C8B-B14F-4D97-AF65-F5344CB8AC3E}">
+        <p14:creationId xmlns:p14="http://schemas.microsoft.com/office/powerpoint/2010/main" val="3361538177"/>
+      </p:ext>
+    </p:extLst>
+  </p:cSld>
+  <p:clrMapOvr>
+    <a:masterClrMapping/>
+  </p:clrMapOvr>
+</p:sld>
+</file>
+
+<file path=ppt/slides/slide9.xml><?xml version="1.0" encoding="utf-8"?>
+<p:sld xmlns:a="http://schemas.openxmlformats.org/drawingml/2006/main" xmlns:r="http://schemas.openxmlformats.org/officeDocument/2006/relationships" xmlns:p="http://schemas.openxmlformats.org/presentationml/2006/main">
+  <p:cSld>
+    <p:spTree>
+      <p:nvGrpSpPr>
+        <p:cNvPr id="1" name=""/>
+        <p:cNvGrpSpPr/>
+        <p:nvPr/>
+      </p:nvGrpSpPr>
+      <p:grpSpPr>
+        <a:xfrm>
+          <a:off x="0" y="0"/>
+          <a:ext cx="0" cy="0"/>
+          <a:chOff x="0" y="0"/>
+          <a:chExt cx="0" cy="0"/>
+        </a:xfrm>
+      </p:grpSpPr>
+      <p:sp>
+        <p:nvSpPr>
+          <p:cNvPr id="2" name="Titel 1">
+            <a:extLst>
+              <a:ext uri="{FF2B5EF4-FFF2-40B4-BE49-F238E27FC236}">
+                <a16:creationId xmlns:a16="http://schemas.microsoft.com/office/drawing/2014/main" id="{C78A0733-316C-490C-9BBF-DC955C847816}"/>
+              </a:ext>
+            </a:extLst>
+          </p:cNvPr>
+          <p:cNvSpPr>
+            <a:spLocks noGrp="1"/>
+          </p:cNvSpPr>
+          <p:nvPr>
+            <p:ph type="title"/>
+          </p:nvPr>
+        </p:nvSpPr>
+        <p:spPr/>
+        <p:txBody>
+          <a:bodyPr/>
+          <a:lstStyle/>
+          <a:p>
+            <a:r>
+              <a:rPr lang="de-CH" dirty="0"/>
+              <a:t>Home </a:t>
+            </a:r>
+            <a:r>
+              <a:rPr lang="de-CH" dirty="0" err="1"/>
+              <a:t>Assistant</a:t>
+            </a:r>
+            <a:r>
+              <a:rPr lang="de-CH" dirty="0"/>
+              <a:t> OS</a:t>
+            </a:r>
+          </a:p>
+        </p:txBody>
+      </p:sp>
+      <p:sp>
+        <p:nvSpPr>
+          <p:cNvPr id="3" name="Inhaltsplatzhalter 2">
+            <a:extLst>
+              <a:ext uri="{FF2B5EF4-FFF2-40B4-BE49-F238E27FC236}">
+                <a16:creationId xmlns:a16="http://schemas.microsoft.com/office/drawing/2014/main" id="{A505D25E-5AD6-4E0F-9CB5-52C3AA836CD8}"/>
+              </a:ext>
+            </a:extLst>
+          </p:cNvPr>
+          <p:cNvSpPr>
+            <a:spLocks noGrp="1"/>
+          </p:cNvSpPr>
+          <p:nvPr>
+            <p:ph idx="1"/>
+          </p:nvPr>
+        </p:nvSpPr>
+        <p:spPr/>
+        <p:txBody>
+          <a:bodyPr/>
+          <a:lstStyle/>
+          <a:p>
+            <a:r>
+              <a:rPr lang="de-CH" dirty="0"/>
+              <a:t>Was ist Home </a:t>
+            </a:r>
+            <a:r>
+              <a:rPr lang="de-CH" dirty="0" err="1"/>
+              <a:t>Assistant</a:t>
+            </a:r>
+            <a:endParaRPr lang="de-CH" dirty="0"/>
+          </a:p>
+          <a:p>
+            <a:r>
+              <a:rPr lang="de-CH" dirty="0" err="1"/>
+              <a:t>Wiso</a:t>
+            </a:r>
+            <a:r>
+              <a:rPr lang="de-CH" dirty="0"/>
+              <a:t> haben wir uns für HA entschieden</a:t>
+            </a:r>
+          </a:p>
+          <a:p>
+            <a:endParaRPr lang="de-CH" dirty="0"/>
+          </a:p>
+        </p:txBody>
+      </p:sp>
+    </p:spTree>
+    <p:extLst>
+      <p:ext uri="{BB962C8B-B14F-4D97-AF65-F5344CB8AC3E}">
+        <p14:creationId xmlns:p14="http://schemas.microsoft.com/office/powerpoint/2010/main" val="473850503"/>
+      </p:ext>
+    </p:extLst>
+  </p:cSld>
+  <p:clrMapOvr>
+    <a:masterClrMapping/>
+  </p:clrMapOvr>
+</p:sld>
+</file>
+
 <file path=ppt/theme/theme1.xml><?xml version="1.0" encoding="utf-8"?>
 <a:theme xmlns:a="http://schemas.openxmlformats.org/drawingml/2006/main" name="Larissa-Design">
   <a:themeElements>
     <a:clrScheme name="Larissa">
       <a:dk1>
-        <a:sysClr val="windowText"/>
+        <a:sysClr val="windowText" lastClr="000000"/>
       </a:dk1>
       <a:lt1>
-        <a:sysClr val="window"/>
+        <a:sysClr val="window" lastClr="FFFFFF"/>
       </a:lt1>
       <a:dk2>
         <a:srgbClr val="1F497D"/>

</xml_diff>